<commit_message>
Made changes according to feedback for A/B testing final project. Finalized documentation uploaded.
</commit_message>
<xml_diff>
--- a/8 DesignAnABTest/Audacity test flow.pptx
+++ b/8 DesignAnABTest/Audacity test flow.pptx
@@ -104,6 +104,11 @@
       </a:defRPr>
     </a:lvl9pPr>
   </p:defaultTextStyle>
+  <p:extLst>
+    <p:ext uri="{EFAFB233-063F-42B5-8137-9DF3F51BA10A}">
+      <p15:sldGuideLst xmlns:p15="http://schemas.microsoft.com/office/powerpoint/2012/main"/>
+    </p:ext>
+  </p:extLst>
 </p:presentation>
 </file>
 
@@ -238,7 +243,7 @@
           <a:p>
             <a:fld id="{1F57B110-6641-4A3E-97F2-61AB2A48526C}" type="datetimeFigureOut">
               <a:rPr lang="nl-NL" smtClean="0"/>
-              <a:t>4-3-2017</a:t>
+              <a:t>12-3-2017</a:t>
             </a:fld>
             <a:endParaRPr lang="nl-NL"/>
           </a:p>
@@ -408,7 +413,7 @@
           <a:p>
             <a:fld id="{1F57B110-6641-4A3E-97F2-61AB2A48526C}" type="datetimeFigureOut">
               <a:rPr lang="nl-NL" smtClean="0"/>
-              <a:t>4-3-2017</a:t>
+              <a:t>12-3-2017</a:t>
             </a:fld>
             <a:endParaRPr lang="nl-NL"/>
           </a:p>
@@ -588,7 +593,7 @@
           <a:p>
             <a:fld id="{1F57B110-6641-4A3E-97F2-61AB2A48526C}" type="datetimeFigureOut">
               <a:rPr lang="nl-NL" smtClean="0"/>
-              <a:t>4-3-2017</a:t>
+              <a:t>12-3-2017</a:t>
             </a:fld>
             <a:endParaRPr lang="nl-NL"/>
           </a:p>
@@ -758,7 +763,7 @@
           <a:p>
             <a:fld id="{1F57B110-6641-4A3E-97F2-61AB2A48526C}" type="datetimeFigureOut">
               <a:rPr lang="nl-NL" smtClean="0"/>
-              <a:t>4-3-2017</a:t>
+              <a:t>12-3-2017</a:t>
             </a:fld>
             <a:endParaRPr lang="nl-NL"/>
           </a:p>
@@ -1004,7 +1009,7 @@
           <a:p>
             <a:fld id="{1F57B110-6641-4A3E-97F2-61AB2A48526C}" type="datetimeFigureOut">
               <a:rPr lang="nl-NL" smtClean="0"/>
-              <a:t>4-3-2017</a:t>
+              <a:t>12-3-2017</a:t>
             </a:fld>
             <a:endParaRPr lang="nl-NL"/>
           </a:p>
@@ -1236,7 +1241,7 @@
           <a:p>
             <a:fld id="{1F57B110-6641-4A3E-97F2-61AB2A48526C}" type="datetimeFigureOut">
               <a:rPr lang="nl-NL" smtClean="0"/>
-              <a:t>4-3-2017</a:t>
+              <a:t>12-3-2017</a:t>
             </a:fld>
             <a:endParaRPr lang="nl-NL"/>
           </a:p>
@@ -1603,7 +1608,7 @@
           <a:p>
             <a:fld id="{1F57B110-6641-4A3E-97F2-61AB2A48526C}" type="datetimeFigureOut">
               <a:rPr lang="nl-NL" smtClean="0"/>
-              <a:t>4-3-2017</a:t>
+              <a:t>12-3-2017</a:t>
             </a:fld>
             <a:endParaRPr lang="nl-NL"/>
           </a:p>
@@ -1721,7 +1726,7 @@
           <a:p>
             <a:fld id="{1F57B110-6641-4A3E-97F2-61AB2A48526C}" type="datetimeFigureOut">
               <a:rPr lang="nl-NL" smtClean="0"/>
-              <a:t>4-3-2017</a:t>
+              <a:t>12-3-2017</a:t>
             </a:fld>
             <a:endParaRPr lang="nl-NL"/>
           </a:p>
@@ -1816,7 +1821,7 @@
           <a:p>
             <a:fld id="{1F57B110-6641-4A3E-97F2-61AB2A48526C}" type="datetimeFigureOut">
               <a:rPr lang="nl-NL" smtClean="0"/>
-              <a:t>4-3-2017</a:t>
+              <a:t>12-3-2017</a:t>
             </a:fld>
             <a:endParaRPr lang="nl-NL"/>
           </a:p>
@@ -2093,7 +2098,7 @@
           <a:p>
             <a:fld id="{1F57B110-6641-4A3E-97F2-61AB2A48526C}" type="datetimeFigureOut">
               <a:rPr lang="nl-NL" smtClean="0"/>
-              <a:t>4-3-2017</a:t>
+              <a:t>12-3-2017</a:t>
             </a:fld>
             <a:endParaRPr lang="nl-NL"/>
           </a:p>
@@ -2346,7 +2351,7 @@
           <a:p>
             <a:fld id="{1F57B110-6641-4A3E-97F2-61AB2A48526C}" type="datetimeFigureOut">
               <a:rPr lang="nl-NL" smtClean="0"/>
-              <a:t>4-3-2017</a:t>
+              <a:t>12-3-2017</a:t>
             </a:fld>
             <a:endParaRPr lang="nl-NL"/>
           </a:p>
@@ -2559,7 +2564,7 @@
           <a:p>
             <a:fld id="{1F57B110-6641-4A3E-97F2-61AB2A48526C}" type="datetimeFigureOut">
               <a:rPr lang="nl-NL" smtClean="0"/>
-              <a:t>4-3-2017</a:t>
+              <a:t>12-3-2017</a:t>
             </a:fld>
             <a:endParaRPr lang="nl-NL"/>
           </a:p>
@@ -2972,12 +2977,26 @@
         </p:nvSpPr>
         <p:spPr>
           <a:xfrm>
-            <a:off x="4761782" y="155276"/>
-            <a:ext cx="1483742" cy="523220"/>
+            <a:off x="4762500" y="155275"/>
+            <a:ext cx="2160000" cy="307777"/>
           </a:xfrm>
           <a:prstGeom prst="rect">
             <a:avLst/>
           </a:prstGeom>
+          <a:solidFill>
+            <a:schemeClr val="accent1">
+              <a:lumMod val="20000"/>
+              <a:lumOff val="80000"/>
+              <a:alpha val="70000"/>
+            </a:schemeClr>
+          </a:solidFill>
+          <a:ln w="19050">
+            <a:solidFill>
+              <a:schemeClr val="accent1">
+                <a:alpha val="50000"/>
+              </a:schemeClr>
+            </a:solidFill>
+          </a:ln>
         </p:spPr>
         <p:style>
           <a:lnRef idx="2">
@@ -3001,10 +3020,18 @@
           <a:p>
             <a:pPr algn="ctr"/>
             <a:r>
-              <a:rPr lang="en-US" sz="1400" dirty="0" smtClean="0"/>
+              <a:rPr lang="en-US" sz="1400" dirty="0" smtClean="0">
+                <a:latin typeface="Malgun Gothic" panose="020B0503020000020004" pitchFamily="34" charset="-127"/>
+                <a:ea typeface="Malgun Gothic" panose="020B0503020000020004" pitchFamily="34" charset="-127"/>
+                <a:cs typeface="Times New Roman" panose="02020603050405020304" pitchFamily="18" charset="0"/>
+              </a:rPr>
               <a:t>Course description page</a:t>
             </a:r>
-            <a:endParaRPr lang="nl-NL" sz="1400" dirty="0"/>
+            <a:endParaRPr lang="nl-NL" sz="1400" dirty="0">
+              <a:latin typeface="Malgun Gothic" panose="020B0503020000020004" pitchFamily="34" charset="-127"/>
+              <a:ea typeface="Malgun Gothic" panose="020B0503020000020004" pitchFamily="34" charset="-127"/>
+              <a:cs typeface="Times New Roman" panose="02020603050405020304" pitchFamily="18" charset="0"/>
+            </a:endParaRPr>
           </a:p>
         </p:txBody>
       </p:sp>
@@ -3016,12 +3043,26 @@
         </p:nvSpPr>
         <p:spPr>
           <a:xfrm>
-            <a:off x="4761782" y="1027020"/>
-            <a:ext cx="1483742" cy="523220"/>
+            <a:off x="4761781" y="836519"/>
+            <a:ext cx="2160000" cy="307777"/>
           </a:xfrm>
           <a:prstGeom prst="rect">
             <a:avLst/>
           </a:prstGeom>
+          <a:solidFill>
+            <a:schemeClr val="accent1">
+              <a:lumMod val="20000"/>
+              <a:lumOff val="80000"/>
+              <a:alpha val="70000"/>
+            </a:schemeClr>
+          </a:solidFill>
+          <a:ln w="19050">
+            <a:solidFill>
+              <a:schemeClr val="accent1">
+                <a:alpha val="50000"/>
+              </a:schemeClr>
+            </a:solidFill>
+          </a:ln>
         </p:spPr>
         <p:style>
           <a:lnRef idx="2">
@@ -3045,10 +3086,18 @@
           <a:p>
             <a:pPr algn="ctr"/>
             <a:r>
-              <a:rPr lang="en-US" sz="1400" dirty="0" smtClean="0"/>
+              <a:rPr lang="en-US" sz="1400" dirty="0" smtClean="0">
+                <a:latin typeface="Malgun Gothic" panose="020B0503020000020004" pitchFamily="34" charset="-127"/>
+                <a:ea typeface="Malgun Gothic" panose="020B0503020000020004" pitchFamily="34" charset="-127"/>
+                <a:cs typeface="Times New Roman" panose="02020603050405020304" pitchFamily="18" charset="0"/>
+              </a:rPr>
               <a:t>Click “start free trial”</a:t>
             </a:r>
-            <a:endParaRPr lang="nl-NL" sz="1400" dirty="0"/>
+            <a:endParaRPr lang="nl-NL" sz="1400" dirty="0">
+              <a:latin typeface="Malgun Gothic" panose="020B0503020000020004" pitchFamily="34" charset="-127"/>
+              <a:ea typeface="Malgun Gothic" panose="020B0503020000020004" pitchFamily="34" charset="-127"/>
+              <a:cs typeface="Times New Roman" panose="02020603050405020304" pitchFamily="18" charset="0"/>
+            </a:endParaRPr>
           </a:p>
         </p:txBody>
       </p:sp>
@@ -3060,12 +3109,26 @@
         </p:nvSpPr>
         <p:spPr>
           <a:xfrm>
-            <a:off x="4761782" y="2024808"/>
-            <a:ext cx="1483742" cy="738664"/>
+            <a:off x="4761782" y="1512792"/>
+            <a:ext cx="2160000" cy="523220"/>
           </a:xfrm>
           <a:prstGeom prst="rect">
             <a:avLst/>
           </a:prstGeom>
+          <a:solidFill>
+            <a:schemeClr val="accent1">
+              <a:lumMod val="20000"/>
+              <a:lumOff val="80000"/>
+              <a:alpha val="70000"/>
+            </a:schemeClr>
+          </a:solidFill>
+          <a:ln w="19050">
+            <a:solidFill>
+              <a:schemeClr val="accent1">
+                <a:alpha val="50000"/>
+              </a:schemeClr>
+            </a:solidFill>
+          </a:ln>
         </p:spPr>
         <p:style>
           <a:lnRef idx="2">
@@ -3089,17 +3152,50 @@
           <a:p>
             <a:pPr algn="ctr"/>
             <a:r>
-              <a:rPr lang="en-US" sz="1400" dirty="0" smtClean="0"/>
-              <a:t>Survey popup </a:t>
-            </a:r>
+              <a:rPr lang="en-US" sz="1400" dirty="0" smtClean="0">
+                <a:latin typeface="Malgun Gothic" panose="020B0503020000020004" pitchFamily="34" charset="-127"/>
+                <a:ea typeface="Malgun Gothic" panose="020B0503020000020004" pitchFamily="34" charset="-127"/>
+                <a:cs typeface="Times New Roman" panose="02020603050405020304" pitchFamily="18" charset="0"/>
+              </a:rPr>
+              <a:t>Survey </a:t>
+            </a:r>
+            <a:r>
+              <a:rPr lang="en-US" sz="1400" dirty="0" smtClean="0">
+                <a:latin typeface="Malgun Gothic" panose="020B0503020000020004" pitchFamily="34" charset="-127"/>
+                <a:ea typeface="Malgun Gothic" panose="020B0503020000020004" pitchFamily="34" charset="-127"/>
+                <a:cs typeface="Times New Roman" panose="02020603050405020304" pitchFamily="18" charset="0"/>
+              </a:rPr>
+              <a:t>popup </a:t>
+            </a:r>
+            <a:endParaRPr lang="en-US" sz="1400" dirty="0" smtClean="0">
+              <a:latin typeface="Malgun Gothic" panose="020B0503020000020004" pitchFamily="34" charset="-127"/>
+              <a:ea typeface="Malgun Gothic" panose="020B0503020000020004" pitchFamily="34" charset="-127"/>
+              <a:cs typeface="Times New Roman" panose="02020603050405020304" pitchFamily="18" charset="0"/>
+            </a:endParaRPr>
           </a:p>
           <a:p>
             <a:pPr algn="ctr"/>
             <a:r>
-              <a:rPr lang="en-US" sz="1400" dirty="0" smtClean="0"/>
-              <a:t>- Input # study hours</a:t>
-            </a:r>
-            <a:endParaRPr lang="nl-NL" sz="1400" dirty="0"/>
+              <a:rPr lang="en-US" sz="1400" dirty="0" smtClean="0">
+                <a:latin typeface="Malgun Gothic" panose="020B0503020000020004" pitchFamily="34" charset="-127"/>
+                <a:ea typeface="Malgun Gothic" panose="020B0503020000020004" pitchFamily="34" charset="-127"/>
+                <a:cs typeface="Times New Roman" panose="02020603050405020304" pitchFamily="18" charset="0"/>
+              </a:rPr>
+              <a:t>Input </a:t>
+            </a:r>
+            <a:r>
+              <a:rPr lang="en-US" sz="1400" dirty="0" smtClean="0">
+                <a:latin typeface="Malgun Gothic" panose="020B0503020000020004" pitchFamily="34" charset="-127"/>
+                <a:ea typeface="Malgun Gothic" panose="020B0503020000020004" pitchFamily="34" charset="-127"/>
+                <a:cs typeface="Times New Roman" panose="02020603050405020304" pitchFamily="18" charset="0"/>
+              </a:rPr>
+              <a:t># study hours</a:t>
+            </a:r>
+            <a:endParaRPr lang="nl-NL" sz="1400" dirty="0">
+              <a:latin typeface="Malgun Gothic" panose="020B0503020000020004" pitchFamily="34" charset="-127"/>
+              <a:ea typeface="Malgun Gothic" panose="020B0503020000020004" pitchFamily="34" charset="-127"/>
+              <a:cs typeface="Times New Roman" panose="02020603050405020304" pitchFamily="18" charset="0"/>
+            </a:endParaRPr>
           </a:p>
         </p:txBody>
       </p:sp>
@@ -3111,12 +3207,26 @@
         </p:nvSpPr>
         <p:spPr>
           <a:xfrm>
-            <a:off x="3278040" y="4393699"/>
-            <a:ext cx="1483742" cy="523220"/>
+            <a:off x="3161662" y="4157671"/>
+            <a:ext cx="2160000" cy="307777"/>
           </a:xfrm>
           <a:prstGeom prst="rect">
             <a:avLst/>
           </a:prstGeom>
+          <a:solidFill>
+            <a:schemeClr val="accent1">
+              <a:lumMod val="20000"/>
+              <a:lumOff val="80000"/>
+              <a:alpha val="70000"/>
+            </a:schemeClr>
+          </a:solidFill>
+          <a:ln w="19050">
+            <a:solidFill>
+              <a:schemeClr val="accent1">
+                <a:alpha val="50000"/>
+              </a:schemeClr>
+            </a:solidFill>
+          </a:ln>
         </p:spPr>
         <p:style>
           <a:lnRef idx="2">
@@ -3140,10 +3250,34 @@
           <a:p>
             <a:pPr algn="ctr"/>
             <a:r>
-              <a:rPr lang="en-US" sz="1400" dirty="0" smtClean="0"/>
-              <a:t>Click “enroll in 14-day free trial”</a:t>
-            </a:r>
-            <a:endParaRPr lang="nl-NL" sz="1400" dirty="0"/>
+              <a:rPr lang="en-US" sz="1400" dirty="0" smtClean="0">
+                <a:latin typeface="Malgun Gothic" panose="020B0503020000020004" pitchFamily="34" charset="-127"/>
+                <a:ea typeface="Malgun Gothic" panose="020B0503020000020004" pitchFamily="34" charset="-127"/>
+                <a:cs typeface="Times New Roman" panose="02020603050405020304" pitchFamily="18" charset="0"/>
+              </a:rPr>
+              <a:t>Click “enroll in </a:t>
+            </a:r>
+            <a:r>
+              <a:rPr lang="en-US" sz="1400" dirty="0" smtClean="0">
+                <a:latin typeface="Malgun Gothic" panose="020B0503020000020004" pitchFamily="34" charset="-127"/>
+                <a:ea typeface="Malgun Gothic" panose="020B0503020000020004" pitchFamily="34" charset="-127"/>
+                <a:cs typeface="Times New Roman" panose="02020603050405020304" pitchFamily="18" charset="0"/>
+              </a:rPr>
+              <a:t>free </a:t>
+            </a:r>
+            <a:r>
+              <a:rPr lang="en-US" sz="1400" dirty="0" smtClean="0">
+                <a:latin typeface="Malgun Gothic" panose="020B0503020000020004" pitchFamily="34" charset="-127"/>
+                <a:ea typeface="Malgun Gothic" panose="020B0503020000020004" pitchFamily="34" charset="-127"/>
+                <a:cs typeface="Times New Roman" panose="02020603050405020304" pitchFamily="18" charset="0"/>
+              </a:rPr>
+              <a:t>trial”</a:t>
+            </a:r>
+            <a:endParaRPr lang="nl-NL" sz="1400" dirty="0">
+              <a:latin typeface="Malgun Gothic" panose="020B0503020000020004" pitchFamily="34" charset="-127"/>
+              <a:ea typeface="Malgun Gothic" panose="020B0503020000020004" pitchFamily="34" charset="-127"/>
+              <a:cs typeface="Times New Roman" panose="02020603050405020304" pitchFamily="18" charset="0"/>
+            </a:endParaRPr>
           </a:p>
         </p:txBody>
       </p:sp>
@@ -3155,12 +3289,26 @@
         </p:nvSpPr>
         <p:spPr>
           <a:xfrm>
-            <a:off x="6245524" y="4392272"/>
-            <a:ext cx="1483742" cy="523220"/>
+            <a:off x="6245524" y="4157671"/>
+            <a:ext cx="2160000" cy="523220"/>
           </a:xfrm>
           <a:prstGeom prst="rect">
             <a:avLst/>
           </a:prstGeom>
+          <a:solidFill>
+            <a:schemeClr val="accent1">
+              <a:lumMod val="20000"/>
+              <a:lumOff val="80000"/>
+              <a:alpha val="70000"/>
+            </a:schemeClr>
+          </a:solidFill>
+          <a:ln w="19050">
+            <a:solidFill>
+              <a:schemeClr val="accent1">
+                <a:alpha val="50000"/>
+              </a:schemeClr>
+            </a:solidFill>
+          </a:ln>
         </p:spPr>
         <p:style>
           <a:lnRef idx="2">
@@ -3184,10 +3332,18 @@
           <a:p>
             <a:pPr algn="ctr"/>
             <a:r>
-              <a:rPr lang="en-US" sz="1400" dirty="0" smtClean="0"/>
+              <a:rPr lang="en-US" sz="1400" dirty="0" smtClean="0">
+                <a:latin typeface="Malgun Gothic" panose="020B0503020000020004" pitchFamily="34" charset="-127"/>
+                <a:ea typeface="Malgun Gothic" panose="020B0503020000020004" pitchFamily="34" charset="-127"/>
+                <a:cs typeface="Times New Roman" panose="02020603050405020304" pitchFamily="18" charset="0"/>
+              </a:rPr>
               <a:t>Access free course material</a:t>
             </a:r>
-            <a:endParaRPr lang="nl-NL" sz="1400" dirty="0"/>
+            <a:endParaRPr lang="nl-NL" sz="1400" dirty="0">
+              <a:latin typeface="Malgun Gothic" panose="020B0503020000020004" pitchFamily="34" charset="-127"/>
+              <a:ea typeface="Malgun Gothic" panose="020B0503020000020004" pitchFamily="34" charset="-127"/>
+              <a:cs typeface="Times New Roman" panose="02020603050405020304" pitchFamily="18" charset="0"/>
+            </a:endParaRPr>
           </a:p>
         </p:txBody>
       </p:sp>
@@ -3199,12 +3355,26 @@
         </p:nvSpPr>
         <p:spPr>
           <a:xfrm>
-            <a:off x="3278040" y="5349169"/>
-            <a:ext cx="1483742" cy="307777"/>
+            <a:off x="3161662" y="4789470"/>
+            <a:ext cx="2160000" cy="307777"/>
           </a:xfrm>
           <a:prstGeom prst="rect">
             <a:avLst/>
           </a:prstGeom>
+          <a:solidFill>
+            <a:schemeClr val="accent1">
+              <a:lumMod val="20000"/>
+              <a:lumOff val="80000"/>
+              <a:alpha val="70000"/>
+            </a:schemeClr>
+          </a:solidFill>
+          <a:ln w="19050">
+            <a:solidFill>
+              <a:schemeClr val="accent1">
+                <a:alpha val="50000"/>
+              </a:schemeClr>
+            </a:solidFill>
+          </a:ln>
         </p:spPr>
         <p:style>
           <a:lnRef idx="2">
@@ -3228,10 +3398,18 @@
           <a:p>
             <a:pPr algn="ctr"/>
             <a:r>
-              <a:rPr lang="en-US" sz="1400" dirty="0" smtClean="0"/>
+              <a:rPr lang="en-US" sz="1400" dirty="0" smtClean="0">
+                <a:latin typeface="Malgun Gothic" panose="020B0503020000020004" pitchFamily="34" charset="-127"/>
+                <a:ea typeface="Malgun Gothic" panose="020B0503020000020004" pitchFamily="34" charset="-127"/>
+                <a:cs typeface="Times New Roman" panose="02020603050405020304" pitchFamily="18" charset="0"/>
+              </a:rPr>
               <a:t>Check out</a:t>
             </a:r>
-            <a:endParaRPr lang="nl-NL" sz="1400" dirty="0"/>
+            <a:endParaRPr lang="nl-NL" sz="1400" dirty="0">
+              <a:latin typeface="Malgun Gothic" panose="020B0503020000020004" pitchFamily="34" charset="-127"/>
+              <a:ea typeface="Malgun Gothic" panose="020B0503020000020004" pitchFamily="34" charset="-127"/>
+              <a:cs typeface="Times New Roman" panose="02020603050405020304" pitchFamily="18" charset="0"/>
+            </a:endParaRPr>
           </a:p>
         </p:txBody>
       </p:sp>
@@ -3243,12 +3421,26 @@
         </p:nvSpPr>
         <p:spPr>
           <a:xfrm>
-            <a:off x="6245524" y="3249149"/>
-            <a:ext cx="1483742" cy="738664"/>
+            <a:off x="6245524" y="2892461"/>
+            <a:ext cx="2160000" cy="738664"/>
           </a:xfrm>
           <a:prstGeom prst="rect">
             <a:avLst/>
           </a:prstGeom>
+          <a:solidFill>
+            <a:schemeClr val="accent1">
+              <a:lumMod val="20000"/>
+              <a:lumOff val="80000"/>
+              <a:alpha val="70000"/>
+            </a:schemeClr>
+          </a:solidFill>
+          <a:ln w="19050">
+            <a:solidFill>
+              <a:schemeClr val="accent1">
+                <a:alpha val="50000"/>
+              </a:schemeClr>
+            </a:solidFill>
+          </a:ln>
         </p:spPr>
         <p:style>
           <a:lnRef idx="2">
@@ -3272,10 +3464,26 @@
           <a:p>
             <a:pPr algn="ctr"/>
             <a:r>
-              <a:rPr lang="en-US" sz="1400" dirty="0" smtClean="0"/>
-              <a:t>Message for greater time commitment</a:t>
-            </a:r>
-            <a:endParaRPr lang="nl-NL" sz="1400" dirty="0"/>
+              <a:rPr lang="en-US" sz="1400" dirty="0" smtClean="0">
+                <a:latin typeface="Malgun Gothic" panose="020B0503020000020004" pitchFamily="34" charset="-127"/>
+                <a:ea typeface="Malgun Gothic" panose="020B0503020000020004" pitchFamily="34" charset="-127"/>
+                <a:cs typeface="Times New Roman" panose="02020603050405020304" pitchFamily="18" charset="0"/>
+              </a:rPr>
+              <a:t>Show message: need </a:t>
+            </a:r>
+            <a:r>
+              <a:rPr lang="en-US" sz="1400" dirty="0" smtClean="0">
+                <a:latin typeface="Malgun Gothic" panose="020B0503020000020004" pitchFamily="34" charset="-127"/>
+                <a:ea typeface="Malgun Gothic" panose="020B0503020000020004" pitchFamily="34" charset="-127"/>
+                <a:cs typeface="Times New Roman" panose="02020603050405020304" pitchFamily="18" charset="0"/>
+              </a:rPr>
+              <a:t>greater time commitment</a:t>
+            </a:r>
+            <a:endParaRPr lang="nl-NL" sz="1400" dirty="0">
+              <a:latin typeface="Malgun Gothic" panose="020B0503020000020004" pitchFamily="34" charset="-127"/>
+              <a:ea typeface="Malgun Gothic" panose="020B0503020000020004" pitchFamily="34" charset="-127"/>
+              <a:cs typeface="Times New Roman" panose="02020603050405020304" pitchFamily="18" charset="0"/>
+            </a:endParaRPr>
           </a:p>
         </p:txBody>
       </p:sp>
@@ -3289,14 +3497,19 @@
           <p:nvPr/>
         </p:nvCxnSpPr>
         <p:spPr>
-          <a:xfrm>
-            <a:off x="5503653" y="678496"/>
-            <a:ext cx="0" cy="348524"/>
+          <a:xfrm flipH="1">
+            <a:off x="5841781" y="463052"/>
+            <a:ext cx="719" cy="373467"/>
           </a:xfrm>
           <a:prstGeom prst="straightConnector1">
             <a:avLst/>
           </a:prstGeom>
-          <a:ln>
+          <a:ln w="19050">
+            <a:solidFill>
+              <a:schemeClr val="accent1">
+                <a:alpha val="50000"/>
+              </a:schemeClr>
+            </a:solidFill>
             <a:tailEnd type="triangle"/>
           </a:ln>
         </p:spPr>
@@ -3326,13 +3539,18 @@
         </p:nvCxnSpPr>
         <p:spPr>
           <a:xfrm>
-            <a:off x="5503653" y="1550240"/>
-            <a:ext cx="0" cy="474568"/>
+            <a:off x="5841781" y="1144296"/>
+            <a:ext cx="1" cy="368496"/>
           </a:xfrm>
           <a:prstGeom prst="straightConnector1">
             <a:avLst/>
           </a:prstGeom>
-          <a:ln>
+          <a:ln w="19050">
+            <a:solidFill>
+              <a:schemeClr val="accent1">
+                <a:alpha val="50000"/>
+              </a:schemeClr>
+            </a:solidFill>
             <a:tailEnd type="triangle"/>
           </a:ln>
         </p:spPr>
@@ -3362,13 +3580,18 @@
         </p:nvCxnSpPr>
         <p:spPr>
           <a:xfrm flipH="1">
-            <a:off x="4019911" y="2763472"/>
-            <a:ext cx="1483742" cy="1630227"/>
+            <a:off x="4241662" y="2036012"/>
+            <a:ext cx="1600120" cy="2121659"/>
           </a:xfrm>
           <a:prstGeom prst="straightConnector1">
             <a:avLst/>
           </a:prstGeom>
-          <a:ln>
+          <a:ln w="19050">
+            <a:solidFill>
+              <a:schemeClr val="accent1">
+                <a:alpha val="50000"/>
+              </a:schemeClr>
+            </a:solidFill>
             <a:tailEnd type="triangle"/>
           </a:ln>
         </p:spPr>
@@ -3398,13 +3621,18 @@
         </p:nvCxnSpPr>
         <p:spPr>
           <a:xfrm>
-            <a:off x="5503653" y="2763472"/>
-            <a:ext cx="1483742" cy="485677"/>
+            <a:off x="5841782" y="2036012"/>
+            <a:ext cx="1483742" cy="856449"/>
           </a:xfrm>
           <a:prstGeom prst="straightConnector1">
             <a:avLst/>
           </a:prstGeom>
-          <a:ln>
+          <a:ln w="19050">
+            <a:solidFill>
+              <a:schemeClr val="accent1">
+                <a:alpha val="50000"/>
+              </a:schemeClr>
+            </a:solidFill>
             <a:tailEnd type="triangle"/>
           </a:ln>
         </p:spPr>
@@ -3434,13 +3662,18 @@
         </p:nvCxnSpPr>
         <p:spPr>
           <a:xfrm flipH="1">
-            <a:off x="4019911" y="3987813"/>
-            <a:ext cx="2967484" cy="405886"/>
+            <a:off x="4241662" y="3631125"/>
+            <a:ext cx="3083862" cy="526546"/>
           </a:xfrm>
           <a:prstGeom prst="straightConnector1">
             <a:avLst/>
           </a:prstGeom>
-          <a:ln>
+          <a:ln w="19050">
+            <a:solidFill>
+              <a:schemeClr val="accent1">
+                <a:alpha val="50000"/>
+              </a:schemeClr>
+            </a:solidFill>
             <a:tailEnd type="triangle"/>
           </a:ln>
         </p:spPr>
@@ -3470,13 +3703,18 @@
         </p:nvCxnSpPr>
         <p:spPr>
           <a:xfrm>
-            <a:off x="6987395" y="3987813"/>
-            <a:ext cx="0" cy="404459"/>
+            <a:off x="7325524" y="3631125"/>
+            <a:ext cx="0" cy="526546"/>
           </a:xfrm>
           <a:prstGeom prst="straightConnector1">
             <a:avLst/>
           </a:prstGeom>
-          <a:ln>
+          <a:ln w="19050">
+            <a:solidFill>
+              <a:schemeClr val="accent1">
+                <a:alpha val="50000"/>
+              </a:schemeClr>
+            </a:solidFill>
             <a:tailEnd type="triangle"/>
           </a:ln>
         </p:spPr>
@@ -3506,13 +3744,18 @@
         </p:nvCxnSpPr>
         <p:spPr>
           <a:xfrm>
-            <a:off x="4019911" y="4916919"/>
-            <a:ext cx="0" cy="432250"/>
+            <a:off x="4241662" y="4465448"/>
+            <a:ext cx="0" cy="324022"/>
           </a:xfrm>
           <a:prstGeom prst="straightConnector1">
             <a:avLst/>
           </a:prstGeom>
-          <a:ln>
+          <a:ln w="19050">
+            <a:solidFill>
+              <a:schemeClr val="accent1">
+                <a:alpha val="50000"/>
+              </a:schemeClr>
+            </a:solidFill>
             <a:tailEnd type="triangle"/>
           </a:ln>
         </p:spPr>
@@ -3539,12 +3782,26 @@
         </p:nvSpPr>
         <p:spPr>
           <a:xfrm>
-            <a:off x="3278040" y="6045468"/>
-            <a:ext cx="1483742" cy="307777"/>
+            <a:off x="3161663" y="5487092"/>
+            <a:ext cx="2160000" cy="307777"/>
           </a:xfrm>
           <a:prstGeom prst="rect">
             <a:avLst/>
           </a:prstGeom>
+          <a:solidFill>
+            <a:schemeClr val="accent1">
+              <a:lumMod val="20000"/>
+              <a:lumOff val="80000"/>
+              <a:alpha val="70000"/>
+            </a:schemeClr>
+          </a:solidFill>
+          <a:ln w="19050">
+            <a:solidFill>
+              <a:schemeClr val="accent1">
+                <a:alpha val="50000"/>
+              </a:schemeClr>
+            </a:solidFill>
+          </a:ln>
         </p:spPr>
         <p:style>
           <a:lnRef idx="2">
@@ -3568,10 +3825,18 @@
           <a:p>
             <a:pPr algn="ctr"/>
             <a:r>
-              <a:rPr lang="en-US" sz="1400" dirty="0" smtClean="0"/>
+              <a:rPr lang="en-US" sz="1400" dirty="0" smtClean="0">
+                <a:latin typeface="Malgun Gothic" panose="020B0503020000020004" pitchFamily="34" charset="-127"/>
+                <a:ea typeface="Malgun Gothic" panose="020B0503020000020004" pitchFamily="34" charset="-127"/>
+                <a:cs typeface="Times New Roman" panose="02020603050405020304" pitchFamily="18" charset="0"/>
+              </a:rPr>
               <a:t>14-day trial</a:t>
             </a:r>
-            <a:endParaRPr lang="nl-NL" sz="1400" dirty="0"/>
+            <a:endParaRPr lang="nl-NL" sz="1400" dirty="0">
+              <a:latin typeface="Malgun Gothic" panose="020B0503020000020004" pitchFamily="34" charset="-127"/>
+              <a:ea typeface="Malgun Gothic" panose="020B0503020000020004" pitchFamily="34" charset="-127"/>
+              <a:cs typeface="Times New Roman" panose="02020603050405020304" pitchFamily="18" charset="0"/>
+            </a:endParaRPr>
           </a:p>
         </p:txBody>
       </p:sp>
@@ -3586,13 +3851,18 @@
         </p:nvCxnSpPr>
         <p:spPr>
           <a:xfrm>
-            <a:off x="4019911" y="5656946"/>
-            <a:ext cx="0" cy="388522"/>
+            <a:off x="4241662" y="5097247"/>
+            <a:ext cx="1" cy="389845"/>
           </a:xfrm>
           <a:prstGeom prst="straightConnector1">
             <a:avLst/>
           </a:prstGeom>
-          <a:ln>
+          <a:ln w="19050">
+            <a:solidFill>
+              <a:schemeClr val="accent1">
+                <a:alpha val="50000"/>
+              </a:schemeClr>
+            </a:solidFill>
             <a:tailEnd type="triangle"/>
           </a:ln>
         </p:spPr>
@@ -3619,12 +3889,26 @@
         </p:nvSpPr>
         <p:spPr>
           <a:xfrm>
-            <a:off x="5216108" y="5697318"/>
-            <a:ext cx="1483742" cy="307777"/>
+            <a:off x="6245524" y="6256648"/>
+            <a:ext cx="2160000" cy="307777"/>
           </a:xfrm>
           <a:prstGeom prst="rect">
             <a:avLst/>
           </a:prstGeom>
+          <a:solidFill>
+            <a:schemeClr val="accent1">
+              <a:lumMod val="20000"/>
+              <a:lumOff val="80000"/>
+              <a:alpha val="70000"/>
+            </a:schemeClr>
+          </a:solidFill>
+          <a:ln w="19050">
+            <a:solidFill>
+              <a:schemeClr val="accent1">
+                <a:alpha val="50000"/>
+              </a:schemeClr>
+            </a:solidFill>
+          </a:ln>
         </p:spPr>
         <p:style>
           <a:lnRef idx="2">
@@ -3648,10 +3932,18 @@
           <a:p>
             <a:pPr algn="ctr"/>
             <a:r>
-              <a:rPr lang="en-US" sz="1400" dirty="0" smtClean="0"/>
+              <a:rPr lang="en-US" sz="1400" dirty="0" smtClean="0">
+                <a:latin typeface="Malgun Gothic" panose="020B0503020000020004" pitchFamily="34" charset="-127"/>
+                <a:ea typeface="Malgun Gothic" panose="020B0503020000020004" pitchFamily="34" charset="-127"/>
+                <a:cs typeface="Times New Roman" panose="02020603050405020304" pitchFamily="18" charset="0"/>
+              </a:rPr>
               <a:t>Retained users</a:t>
             </a:r>
-            <a:endParaRPr lang="nl-NL" sz="1400" dirty="0"/>
+            <a:endParaRPr lang="nl-NL" sz="1400" dirty="0">
+              <a:latin typeface="Malgun Gothic" panose="020B0503020000020004" pitchFamily="34" charset="-127"/>
+              <a:ea typeface="Malgun Gothic" panose="020B0503020000020004" pitchFamily="34" charset="-127"/>
+              <a:cs typeface="Times New Roman" panose="02020603050405020304" pitchFamily="18" charset="0"/>
+            </a:endParaRPr>
           </a:p>
         </p:txBody>
       </p:sp>
@@ -3663,18 +3955,26 @@
         </p:nvSpPr>
         <p:spPr>
           <a:xfrm>
-            <a:off x="5216108" y="6324786"/>
-            <a:ext cx="1483742" cy="307777"/>
+            <a:off x="6245524" y="5487091"/>
+            <a:ext cx="2160000" cy="307777"/>
           </a:xfrm>
           <a:prstGeom prst="rect">
             <a:avLst/>
           </a:prstGeom>
           <a:solidFill>
             <a:schemeClr val="accent1">
-              <a:lumMod val="40000"/>
-              <a:lumOff val="60000"/>
+              <a:lumMod val="20000"/>
+              <a:lumOff val="80000"/>
+              <a:alpha val="70000"/>
             </a:schemeClr>
           </a:solidFill>
+          <a:ln w="19050">
+            <a:solidFill>
+              <a:schemeClr val="accent1">
+                <a:alpha val="50000"/>
+              </a:schemeClr>
+            </a:solidFill>
+          </a:ln>
         </p:spPr>
         <p:style>
           <a:lnRef idx="2">
@@ -3698,10 +3998,18 @@
           <a:p>
             <a:pPr algn="ctr"/>
             <a:r>
-              <a:rPr lang="en-US" sz="1400" dirty="0" smtClean="0"/>
+              <a:rPr lang="en-US" sz="1400" dirty="0" smtClean="0">
+                <a:latin typeface="Malgun Gothic" panose="020B0503020000020004" pitchFamily="34" charset="-127"/>
+                <a:ea typeface="Malgun Gothic" panose="020B0503020000020004" pitchFamily="34" charset="-127"/>
+                <a:cs typeface="Times New Roman" panose="02020603050405020304" pitchFamily="18" charset="0"/>
+              </a:rPr>
               <a:t>Churned users</a:t>
             </a:r>
-            <a:endParaRPr lang="nl-NL" sz="1400" dirty="0"/>
+            <a:endParaRPr lang="nl-NL" sz="1400" dirty="0">
+              <a:latin typeface="Malgun Gothic" panose="020B0503020000020004" pitchFamily="34" charset="-127"/>
+              <a:ea typeface="Malgun Gothic" panose="020B0503020000020004" pitchFamily="34" charset="-127"/>
+              <a:cs typeface="Times New Roman" panose="02020603050405020304" pitchFamily="18" charset="0"/>
+            </a:endParaRPr>
           </a:p>
         </p:txBody>
       </p:sp>
@@ -3709,20 +4017,25 @@
         <p:nvCxnSpPr>
           <p:cNvPr id="43" name="Straight Arrow Connector 42"/>
           <p:cNvCxnSpPr>
-            <a:stCxn id="37" idx="3"/>
+            <a:stCxn id="105" idx="3"/>
             <a:endCxn id="40" idx="1"/>
           </p:cNvCxnSpPr>
           <p:nvPr/>
         </p:nvCxnSpPr>
         <p:spPr>
-          <a:xfrm flipV="1">
-            <a:off x="4761782" y="5851207"/>
-            <a:ext cx="454326" cy="348150"/>
+          <a:xfrm>
+            <a:off x="5321662" y="6410537"/>
+            <a:ext cx="923862" cy="0"/>
           </a:xfrm>
           <a:prstGeom prst="straightConnector1">
             <a:avLst/>
           </a:prstGeom>
-          <a:ln>
+          <a:ln w="19050">
+            <a:solidFill>
+              <a:schemeClr val="accent1">
+                <a:alpha val="50000"/>
+              </a:schemeClr>
+            </a:solidFill>
             <a:tailEnd type="triangle"/>
           </a:ln>
         </p:spPr>
@@ -3751,14 +4064,19 @@
           <p:nvPr/>
         </p:nvCxnSpPr>
         <p:spPr>
-          <a:xfrm>
-            <a:off x="4761782" y="6199357"/>
-            <a:ext cx="454326" cy="279318"/>
+          <a:xfrm flipV="1">
+            <a:off x="5321663" y="5640980"/>
+            <a:ext cx="923861" cy="1"/>
           </a:xfrm>
           <a:prstGeom prst="straightConnector1">
             <a:avLst/>
           </a:prstGeom>
-          <a:ln>
+          <a:ln w="19050">
+            <a:solidFill>
+              <a:schemeClr val="accent1">
+                <a:alpha val="50000"/>
+              </a:schemeClr>
+            </a:solidFill>
             <a:tailEnd type="triangle"/>
           </a:ln>
         </p:spPr>
@@ -3785,8 +4103,8 @@
         </p:nvSpPr>
         <p:spPr>
           <a:xfrm>
-            <a:off x="3743864" y="3259740"/>
-            <a:ext cx="1296124" cy="276999"/>
+            <a:off x="3621248" y="2399210"/>
+            <a:ext cx="1529586" cy="261610"/>
           </a:xfrm>
           <a:prstGeom prst="rect">
             <a:avLst/>
@@ -3800,10 +4118,30 @@
           <a:lstStyle/>
           <a:p>
             <a:r>
-              <a:rPr lang="en-US" sz="1200" dirty="0" smtClean="0"/>
-              <a:t>Commit &gt; 5 hours</a:t>
-            </a:r>
-            <a:endParaRPr lang="nl-NL" sz="1200" dirty="0"/>
+              <a:rPr lang="en-US" sz="1100" dirty="0" smtClean="0">
+                <a:latin typeface="Malgun Gothic" panose="020B0503020000020004" pitchFamily="34" charset="-127"/>
+                <a:ea typeface="Malgun Gothic" panose="020B0503020000020004" pitchFamily="34" charset="-127"/>
+              </a:rPr>
+              <a:t>Commit </a:t>
+            </a:r>
+            <a:r>
+              <a:rPr lang="en-US" sz="1100" dirty="0" smtClean="0">
+                <a:latin typeface="Malgun Gothic" panose="020B0503020000020004" pitchFamily="34" charset="-127"/>
+                <a:ea typeface="Malgun Gothic" panose="020B0503020000020004" pitchFamily="34" charset="-127"/>
+              </a:rPr>
+              <a:t>&gt;= </a:t>
+            </a:r>
+            <a:r>
+              <a:rPr lang="en-US" sz="1100" dirty="0" smtClean="0">
+                <a:latin typeface="Malgun Gothic" panose="020B0503020000020004" pitchFamily="34" charset="-127"/>
+                <a:ea typeface="Malgun Gothic" panose="020B0503020000020004" pitchFamily="34" charset="-127"/>
+              </a:rPr>
+              <a:t>5 hours</a:t>
+            </a:r>
+            <a:endParaRPr lang="nl-NL" sz="1100" dirty="0">
+              <a:latin typeface="Malgun Gothic" panose="020B0503020000020004" pitchFamily="34" charset="-127"/>
+              <a:ea typeface="Malgun Gothic" panose="020B0503020000020004" pitchFamily="34" charset="-127"/>
+            </a:endParaRPr>
           </a:p>
         </p:txBody>
       </p:sp>
@@ -3815,8 +4153,8 @@
         </p:nvSpPr>
         <p:spPr>
           <a:xfrm>
-            <a:off x="6648092" y="2834364"/>
-            <a:ext cx="1296124" cy="276999"/>
+            <a:off x="6699850" y="2295771"/>
+            <a:ext cx="1428596" cy="261610"/>
           </a:xfrm>
           <a:prstGeom prst="rect">
             <a:avLst/>
@@ -3830,10 +4168,16 @@
           <a:lstStyle/>
           <a:p>
             <a:r>
-              <a:rPr lang="en-US" sz="1200" dirty="0" smtClean="0"/>
+              <a:rPr lang="en-US" sz="1100" dirty="0" smtClean="0">
+                <a:latin typeface="Malgun Gothic" panose="020B0503020000020004" pitchFamily="34" charset="-127"/>
+                <a:ea typeface="Malgun Gothic" panose="020B0503020000020004" pitchFamily="34" charset="-127"/>
+              </a:rPr>
               <a:t>Commit &lt; 5 hours</a:t>
             </a:r>
-            <a:endParaRPr lang="nl-NL" sz="1200" dirty="0"/>
+            <a:endParaRPr lang="nl-NL" sz="1100" dirty="0">
+              <a:latin typeface="Malgun Gothic" panose="020B0503020000020004" pitchFamily="34" charset="-127"/>
+              <a:ea typeface="Malgun Gothic" panose="020B0503020000020004" pitchFamily="34" charset="-127"/>
+            </a:endParaRPr>
           </a:p>
         </p:txBody>
       </p:sp>
@@ -3845,7 +4189,7 @@
         </p:nvSpPr>
         <p:spPr>
           <a:xfrm>
-            <a:off x="8918219" y="3992162"/>
+            <a:off x="9032519" y="451381"/>
             <a:ext cx="2731587" cy="1754326"/>
           </a:xfrm>
           <a:prstGeom prst="rect">
@@ -3862,6 +4206,653 @@
             <a:r>
               <a:rPr lang="en-US" dirty="0" smtClean="0"/>
               <a:t>Main goal is to reduce the number of churned users in the 14-day trial time, without reducing the number of retained users past the 14-day trial time.</a:t>
+            </a:r>
+            <a:endParaRPr lang="nl-NL" dirty="0"/>
+          </a:p>
+        </p:txBody>
+      </p:sp>
+      <p:sp>
+        <p:nvSpPr>
+          <p:cNvPr id="93" name="TextBox 92"/>
+          <p:cNvSpPr txBox="1"/>
+          <p:nvPr/>
+        </p:nvSpPr>
+        <p:spPr>
+          <a:xfrm>
+            <a:off x="4862265" y="3753555"/>
+            <a:ext cx="1374094" cy="261610"/>
+          </a:xfrm>
+          <a:prstGeom prst="rect">
+            <a:avLst/>
+          </a:prstGeom>
+          <a:noFill/>
+        </p:spPr>
+        <p:txBody>
+          <a:bodyPr wrap="none" rtlCol="0">
+            <a:spAutoFit/>
+          </a:bodyPr>
+          <a:lstStyle/>
+          <a:p>
+            <a:r>
+              <a:rPr lang="en-US" sz="1100" dirty="0" smtClean="0">
+                <a:latin typeface="Malgun Gothic" panose="020B0503020000020004" pitchFamily="34" charset="-127"/>
+                <a:ea typeface="Malgun Gothic" panose="020B0503020000020004" pitchFamily="34" charset="-127"/>
+              </a:rPr>
+              <a:t>Continue with trial</a:t>
+            </a:r>
+            <a:endParaRPr lang="nl-NL" sz="1100" dirty="0">
+              <a:latin typeface="Malgun Gothic" panose="020B0503020000020004" pitchFamily="34" charset="-127"/>
+              <a:ea typeface="Malgun Gothic" panose="020B0503020000020004" pitchFamily="34" charset="-127"/>
+            </a:endParaRPr>
+          </a:p>
+        </p:txBody>
+      </p:sp>
+      <p:sp>
+        <p:nvSpPr>
+          <p:cNvPr id="94" name="TextBox 93"/>
+          <p:cNvSpPr txBox="1"/>
+          <p:nvPr/>
+        </p:nvSpPr>
+        <p:spPr>
+          <a:xfrm>
+            <a:off x="7429620" y="3773631"/>
+            <a:ext cx="1749197" cy="261610"/>
+          </a:xfrm>
+          <a:prstGeom prst="rect">
+            <a:avLst/>
+          </a:prstGeom>
+          <a:noFill/>
+        </p:spPr>
+        <p:txBody>
+          <a:bodyPr wrap="none" rtlCol="0">
+            <a:spAutoFit/>
+          </a:bodyPr>
+          <a:lstStyle/>
+          <a:p>
+            <a:r>
+              <a:rPr lang="en-US" sz="1100" dirty="0" smtClean="0">
+                <a:latin typeface="Malgun Gothic" panose="020B0503020000020004" pitchFamily="34" charset="-127"/>
+                <a:ea typeface="Malgun Gothic" panose="020B0503020000020004" pitchFamily="34" charset="-127"/>
+              </a:rPr>
+              <a:t>Don’t continue with trial</a:t>
+            </a:r>
+            <a:endParaRPr lang="nl-NL" sz="1100" dirty="0">
+              <a:latin typeface="Malgun Gothic" panose="020B0503020000020004" pitchFamily="34" charset="-127"/>
+              <a:ea typeface="Malgun Gothic" panose="020B0503020000020004" pitchFamily="34" charset="-127"/>
+            </a:endParaRPr>
+          </a:p>
+        </p:txBody>
+      </p:sp>
+      <p:sp>
+        <p:nvSpPr>
+          <p:cNvPr id="95" name="Oval 94"/>
+          <p:cNvSpPr/>
+          <p:nvPr/>
+        </p:nvSpPr>
+        <p:spPr>
+          <a:xfrm>
+            <a:off x="4386041" y="166946"/>
+            <a:ext cx="308574" cy="296106"/>
+          </a:xfrm>
+          <a:prstGeom prst="ellipse">
+            <a:avLst/>
+          </a:prstGeom>
+          <a:solidFill>
+            <a:schemeClr val="accent1">
+              <a:alpha val="80000"/>
+            </a:schemeClr>
+          </a:solidFill>
+          <a:ln>
+            <a:noFill/>
+          </a:ln>
+        </p:spPr>
+        <p:style>
+          <a:lnRef idx="2">
+            <a:schemeClr val="accent1">
+              <a:shade val="50000"/>
+            </a:schemeClr>
+          </a:lnRef>
+          <a:fillRef idx="1">
+            <a:schemeClr val="accent1"/>
+          </a:fillRef>
+          <a:effectRef idx="0">
+            <a:schemeClr val="accent1"/>
+          </a:effectRef>
+          <a:fontRef idx="minor">
+            <a:schemeClr val="lt1"/>
+          </a:fontRef>
+        </p:style>
+        <p:txBody>
+          <a:bodyPr rtlCol="0" anchor="ctr"/>
+          <a:lstStyle/>
+          <a:p>
+            <a:pPr algn="ctr"/>
+            <a:r>
+              <a:rPr lang="en-US" dirty="0" smtClean="0"/>
+              <a:t>1</a:t>
+            </a:r>
+            <a:endParaRPr lang="nl-NL" dirty="0"/>
+          </a:p>
+        </p:txBody>
+      </p:sp>
+      <p:sp>
+        <p:nvSpPr>
+          <p:cNvPr id="96" name="Oval 95"/>
+          <p:cNvSpPr/>
+          <p:nvPr/>
+        </p:nvSpPr>
+        <p:spPr>
+          <a:xfrm>
+            <a:off x="4386041" y="813347"/>
+            <a:ext cx="308574" cy="296106"/>
+          </a:xfrm>
+          <a:prstGeom prst="ellipse">
+            <a:avLst/>
+          </a:prstGeom>
+          <a:solidFill>
+            <a:schemeClr val="accent1">
+              <a:alpha val="80000"/>
+            </a:schemeClr>
+          </a:solidFill>
+          <a:ln>
+            <a:noFill/>
+          </a:ln>
+        </p:spPr>
+        <p:style>
+          <a:lnRef idx="2">
+            <a:schemeClr val="accent1">
+              <a:shade val="50000"/>
+            </a:schemeClr>
+          </a:lnRef>
+          <a:fillRef idx="1">
+            <a:schemeClr val="accent1"/>
+          </a:fillRef>
+          <a:effectRef idx="0">
+            <a:schemeClr val="accent1"/>
+          </a:effectRef>
+          <a:fontRef idx="minor">
+            <a:schemeClr val="lt1"/>
+          </a:fontRef>
+        </p:style>
+        <p:txBody>
+          <a:bodyPr rtlCol="0" anchor="ctr"/>
+          <a:lstStyle/>
+          <a:p>
+            <a:pPr algn="ctr"/>
+            <a:r>
+              <a:rPr lang="en-US" dirty="0" smtClean="0"/>
+              <a:t>2</a:t>
+            </a:r>
+            <a:endParaRPr lang="nl-NL" dirty="0"/>
+          </a:p>
+        </p:txBody>
+      </p:sp>
+      <p:sp>
+        <p:nvSpPr>
+          <p:cNvPr id="97" name="Oval 96"/>
+          <p:cNvSpPr/>
+          <p:nvPr/>
+        </p:nvSpPr>
+        <p:spPr>
+          <a:xfrm>
+            <a:off x="4386041" y="1512792"/>
+            <a:ext cx="308574" cy="296106"/>
+          </a:xfrm>
+          <a:prstGeom prst="ellipse">
+            <a:avLst/>
+          </a:prstGeom>
+          <a:solidFill>
+            <a:schemeClr val="accent1">
+              <a:alpha val="80000"/>
+            </a:schemeClr>
+          </a:solidFill>
+          <a:ln>
+            <a:noFill/>
+          </a:ln>
+        </p:spPr>
+        <p:style>
+          <a:lnRef idx="2">
+            <a:schemeClr val="accent1">
+              <a:shade val="50000"/>
+            </a:schemeClr>
+          </a:lnRef>
+          <a:fillRef idx="1">
+            <a:schemeClr val="accent1"/>
+          </a:fillRef>
+          <a:effectRef idx="0">
+            <a:schemeClr val="accent1"/>
+          </a:effectRef>
+          <a:fontRef idx="minor">
+            <a:schemeClr val="lt1"/>
+          </a:fontRef>
+        </p:style>
+        <p:txBody>
+          <a:bodyPr rtlCol="0" anchor="ctr"/>
+          <a:lstStyle/>
+          <a:p>
+            <a:pPr algn="ctr"/>
+            <a:r>
+              <a:rPr lang="en-US" dirty="0"/>
+              <a:t>3</a:t>
+            </a:r>
+            <a:endParaRPr lang="nl-NL" dirty="0"/>
+          </a:p>
+        </p:txBody>
+      </p:sp>
+      <p:sp>
+        <p:nvSpPr>
+          <p:cNvPr id="98" name="Oval 97"/>
+          <p:cNvSpPr/>
+          <p:nvPr/>
+        </p:nvSpPr>
+        <p:spPr>
+          <a:xfrm>
+            <a:off x="5893850" y="2892461"/>
+            <a:ext cx="308574" cy="296106"/>
+          </a:xfrm>
+          <a:prstGeom prst="ellipse">
+            <a:avLst/>
+          </a:prstGeom>
+          <a:solidFill>
+            <a:schemeClr val="accent1">
+              <a:alpha val="80000"/>
+            </a:schemeClr>
+          </a:solidFill>
+          <a:ln>
+            <a:noFill/>
+          </a:ln>
+        </p:spPr>
+        <p:style>
+          <a:lnRef idx="2">
+            <a:schemeClr val="accent1">
+              <a:shade val="50000"/>
+            </a:schemeClr>
+          </a:lnRef>
+          <a:fillRef idx="1">
+            <a:schemeClr val="accent1"/>
+          </a:fillRef>
+          <a:effectRef idx="0">
+            <a:schemeClr val="accent1"/>
+          </a:effectRef>
+          <a:fontRef idx="minor">
+            <a:schemeClr val="lt1"/>
+          </a:fontRef>
+        </p:style>
+        <p:txBody>
+          <a:bodyPr rtlCol="0" anchor="ctr"/>
+          <a:lstStyle/>
+          <a:p>
+            <a:pPr algn="ctr"/>
+            <a:r>
+              <a:rPr lang="en-US" dirty="0"/>
+              <a:t>4</a:t>
+            </a:r>
+            <a:endParaRPr lang="nl-NL" dirty="0"/>
+          </a:p>
+        </p:txBody>
+      </p:sp>
+      <p:sp>
+        <p:nvSpPr>
+          <p:cNvPr id="99" name="Oval 98"/>
+          <p:cNvSpPr/>
+          <p:nvPr/>
+        </p:nvSpPr>
+        <p:spPr>
+          <a:xfrm>
+            <a:off x="2754446" y="4169342"/>
+            <a:ext cx="308574" cy="296106"/>
+          </a:xfrm>
+          <a:prstGeom prst="ellipse">
+            <a:avLst/>
+          </a:prstGeom>
+          <a:solidFill>
+            <a:schemeClr val="accent1">
+              <a:alpha val="80000"/>
+            </a:schemeClr>
+          </a:solidFill>
+          <a:ln>
+            <a:noFill/>
+          </a:ln>
+        </p:spPr>
+        <p:style>
+          <a:lnRef idx="2">
+            <a:schemeClr val="accent1">
+              <a:shade val="50000"/>
+            </a:schemeClr>
+          </a:lnRef>
+          <a:fillRef idx="1">
+            <a:schemeClr val="accent1"/>
+          </a:fillRef>
+          <a:effectRef idx="0">
+            <a:schemeClr val="accent1"/>
+          </a:effectRef>
+          <a:fontRef idx="minor">
+            <a:schemeClr val="lt1"/>
+          </a:fontRef>
+        </p:style>
+        <p:txBody>
+          <a:bodyPr rtlCol="0" anchor="ctr"/>
+          <a:lstStyle/>
+          <a:p>
+            <a:pPr algn="ctr"/>
+            <a:r>
+              <a:rPr lang="en-US" dirty="0"/>
+              <a:t>5</a:t>
+            </a:r>
+            <a:endParaRPr lang="nl-NL" dirty="0"/>
+          </a:p>
+        </p:txBody>
+      </p:sp>
+      <p:sp>
+        <p:nvSpPr>
+          <p:cNvPr id="101" name="Oval 100"/>
+          <p:cNvSpPr/>
+          <p:nvPr/>
+        </p:nvSpPr>
+        <p:spPr>
+          <a:xfrm>
+            <a:off x="2754446" y="4795305"/>
+            <a:ext cx="308574" cy="296106"/>
+          </a:xfrm>
+          <a:prstGeom prst="ellipse">
+            <a:avLst/>
+          </a:prstGeom>
+          <a:solidFill>
+            <a:schemeClr val="accent1">
+              <a:alpha val="80000"/>
+            </a:schemeClr>
+          </a:solidFill>
+          <a:ln>
+            <a:noFill/>
+          </a:ln>
+        </p:spPr>
+        <p:style>
+          <a:lnRef idx="2">
+            <a:schemeClr val="accent1">
+              <a:shade val="50000"/>
+            </a:schemeClr>
+          </a:lnRef>
+          <a:fillRef idx="1">
+            <a:schemeClr val="accent1"/>
+          </a:fillRef>
+          <a:effectRef idx="0">
+            <a:schemeClr val="accent1"/>
+          </a:effectRef>
+          <a:fontRef idx="minor">
+            <a:schemeClr val="lt1"/>
+          </a:fontRef>
+        </p:style>
+        <p:txBody>
+          <a:bodyPr rtlCol="0" anchor="ctr"/>
+          <a:lstStyle/>
+          <a:p>
+            <a:pPr algn="ctr"/>
+            <a:r>
+              <a:rPr lang="en-US" dirty="0"/>
+              <a:t>6</a:t>
+            </a:r>
+            <a:endParaRPr lang="nl-NL" dirty="0"/>
+          </a:p>
+        </p:txBody>
+      </p:sp>
+      <p:sp>
+        <p:nvSpPr>
+          <p:cNvPr id="102" name="Oval 101"/>
+          <p:cNvSpPr/>
+          <p:nvPr/>
+        </p:nvSpPr>
+        <p:spPr>
+          <a:xfrm>
+            <a:off x="2754446" y="5523370"/>
+            <a:ext cx="308574" cy="296106"/>
+          </a:xfrm>
+          <a:prstGeom prst="ellipse">
+            <a:avLst/>
+          </a:prstGeom>
+          <a:solidFill>
+            <a:schemeClr val="accent1">
+              <a:alpha val="80000"/>
+            </a:schemeClr>
+          </a:solidFill>
+          <a:ln>
+            <a:noFill/>
+          </a:ln>
+        </p:spPr>
+        <p:style>
+          <a:lnRef idx="2">
+            <a:schemeClr val="accent1">
+              <a:shade val="50000"/>
+            </a:schemeClr>
+          </a:lnRef>
+          <a:fillRef idx="1">
+            <a:schemeClr val="accent1"/>
+          </a:fillRef>
+          <a:effectRef idx="0">
+            <a:schemeClr val="accent1"/>
+          </a:effectRef>
+          <a:fontRef idx="minor">
+            <a:schemeClr val="lt1"/>
+          </a:fontRef>
+        </p:style>
+        <p:txBody>
+          <a:bodyPr rtlCol="0" anchor="ctr"/>
+          <a:lstStyle/>
+          <a:p>
+            <a:pPr algn="ctr"/>
+            <a:r>
+              <a:rPr lang="en-US" dirty="0"/>
+              <a:t>7</a:t>
+            </a:r>
+            <a:endParaRPr lang="nl-NL" dirty="0"/>
+          </a:p>
+        </p:txBody>
+      </p:sp>
+      <p:sp>
+        <p:nvSpPr>
+          <p:cNvPr id="105" name="TextBox 104"/>
+          <p:cNvSpPr txBox="1"/>
+          <p:nvPr/>
+        </p:nvSpPr>
+        <p:spPr>
+          <a:xfrm>
+            <a:off x="3161662" y="6148927"/>
+            <a:ext cx="2160000" cy="523220"/>
+          </a:xfrm>
+          <a:prstGeom prst="rect">
+            <a:avLst/>
+          </a:prstGeom>
+          <a:solidFill>
+            <a:schemeClr val="accent1">
+              <a:lumMod val="20000"/>
+              <a:lumOff val="80000"/>
+              <a:alpha val="70000"/>
+            </a:schemeClr>
+          </a:solidFill>
+          <a:ln w="19050">
+            <a:solidFill>
+              <a:schemeClr val="accent1">
+                <a:alpha val="50000"/>
+              </a:schemeClr>
+            </a:solidFill>
+          </a:ln>
+        </p:spPr>
+        <p:style>
+          <a:lnRef idx="2">
+            <a:schemeClr val="accent1"/>
+          </a:lnRef>
+          <a:fillRef idx="1">
+            <a:schemeClr val="lt1"/>
+          </a:fillRef>
+          <a:effectRef idx="0">
+            <a:schemeClr val="accent1"/>
+          </a:effectRef>
+          <a:fontRef idx="minor">
+            <a:schemeClr val="dk1"/>
+          </a:fontRef>
+        </p:style>
+        <p:txBody>
+          <a:bodyPr wrap="square" rtlCol="0">
+            <a:spAutoFit/>
+          </a:bodyPr>
+          <a:lstStyle/>
+          <a:p>
+            <a:pPr algn="ctr"/>
+            <a:r>
+              <a:rPr lang="en-US" sz="1400" dirty="0" smtClean="0">
+                <a:latin typeface="Malgun Gothic" panose="020B0503020000020004" pitchFamily="34" charset="-127"/>
+                <a:ea typeface="Malgun Gothic" panose="020B0503020000020004" pitchFamily="34" charset="-127"/>
+                <a:cs typeface="Times New Roman" panose="02020603050405020304" pitchFamily="18" charset="0"/>
+              </a:rPr>
+              <a:t>Continue with the course</a:t>
+            </a:r>
+            <a:endParaRPr lang="nl-NL" sz="1400" dirty="0">
+              <a:latin typeface="Malgun Gothic" panose="020B0503020000020004" pitchFamily="34" charset="-127"/>
+              <a:ea typeface="Malgun Gothic" panose="020B0503020000020004" pitchFamily="34" charset="-127"/>
+              <a:cs typeface="Times New Roman" panose="02020603050405020304" pitchFamily="18" charset="0"/>
+            </a:endParaRPr>
+          </a:p>
+        </p:txBody>
+      </p:sp>
+      <p:cxnSp>
+        <p:nvCxnSpPr>
+          <p:cNvPr id="111" name="Straight Arrow Connector 110"/>
+          <p:cNvCxnSpPr>
+            <a:stCxn id="37" idx="2"/>
+            <a:endCxn id="105" idx="0"/>
+          </p:cNvCxnSpPr>
+          <p:nvPr/>
+        </p:nvCxnSpPr>
+        <p:spPr>
+          <a:xfrm flipH="1">
+            <a:off x="4241662" y="5794869"/>
+            <a:ext cx="1" cy="354058"/>
+          </a:xfrm>
+          <a:prstGeom prst="straightConnector1">
+            <a:avLst/>
+          </a:prstGeom>
+          <a:ln w="19050">
+            <a:solidFill>
+              <a:schemeClr val="accent1">
+                <a:alpha val="50000"/>
+              </a:schemeClr>
+            </a:solidFill>
+            <a:tailEnd type="triangle"/>
+          </a:ln>
+        </p:spPr>
+        <p:style>
+          <a:lnRef idx="1">
+            <a:schemeClr val="accent1"/>
+          </a:lnRef>
+          <a:fillRef idx="0">
+            <a:schemeClr val="accent1"/>
+          </a:fillRef>
+          <a:effectRef idx="0">
+            <a:schemeClr val="accent1"/>
+          </a:effectRef>
+          <a:fontRef idx="minor">
+            <a:schemeClr val="tx1"/>
+          </a:fontRef>
+        </p:style>
+      </p:cxnSp>
+      <p:sp>
+        <p:nvSpPr>
+          <p:cNvPr id="117" name="Oval 116"/>
+          <p:cNvSpPr/>
+          <p:nvPr/>
+        </p:nvSpPr>
+        <p:spPr>
+          <a:xfrm>
+            <a:off x="2754446" y="6148927"/>
+            <a:ext cx="308574" cy="296106"/>
+          </a:xfrm>
+          <a:prstGeom prst="ellipse">
+            <a:avLst/>
+          </a:prstGeom>
+          <a:solidFill>
+            <a:schemeClr val="accent1">
+              <a:alpha val="80000"/>
+            </a:schemeClr>
+          </a:solidFill>
+          <a:ln>
+            <a:noFill/>
+          </a:ln>
+        </p:spPr>
+        <p:style>
+          <a:lnRef idx="2">
+            <a:schemeClr val="accent1">
+              <a:shade val="50000"/>
+            </a:schemeClr>
+          </a:lnRef>
+          <a:fillRef idx="1">
+            <a:schemeClr val="accent1"/>
+          </a:fillRef>
+          <a:effectRef idx="0">
+            <a:schemeClr val="accent1"/>
+          </a:effectRef>
+          <a:fontRef idx="minor">
+            <a:schemeClr val="lt1"/>
+          </a:fontRef>
+        </p:style>
+        <p:txBody>
+          <a:bodyPr rtlCol="0" anchor="ctr"/>
+          <a:lstStyle/>
+          <a:p>
+            <a:pPr algn="ctr"/>
+            <a:r>
+              <a:rPr lang="en-US" dirty="0"/>
+              <a:t>8</a:t>
+            </a:r>
+            <a:endParaRPr lang="nl-NL" dirty="0"/>
+          </a:p>
+        </p:txBody>
+      </p:sp>
+      <p:sp>
+        <p:nvSpPr>
+          <p:cNvPr id="118" name="Oval 117"/>
+          <p:cNvSpPr/>
+          <p:nvPr/>
+        </p:nvSpPr>
+        <p:spPr>
+          <a:xfrm>
+            <a:off x="5902395" y="4170095"/>
+            <a:ext cx="308574" cy="296106"/>
+          </a:xfrm>
+          <a:prstGeom prst="ellipse">
+            <a:avLst/>
+          </a:prstGeom>
+          <a:solidFill>
+            <a:schemeClr val="accent1">
+              <a:alpha val="80000"/>
+            </a:schemeClr>
+          </a:solidFill>
+          <a:ln>
+            <a:noFill/>
+          </a:ln>
+        </p:spPr>
+        <p:style>
+          <a:lnRef idx="2">
+            <a:schemeClr val="accent1">
+              <a:shade val="50000"/>
+            </a:schemeClr>
+          </a:lnRef>
+          <a:fillRef idx="1">
+            <a:schemeClr val="accent1"/>
+          </a:fillRef>
+          <a:effectRef idx="0">
+            <a:schemeClr val="accent1"/>
+          </a:effectRef>
+          <a:fontRef idx="minor">
+            <a:schemeClr val="lt1"/>
+          </a:fontRef>
+        </p:style>
+        <p:txBody>
+          <a:bodyPr rtlCol="0" anchor="ctr"/>
+          <a:lstStyle/>
+          <a:p>
+            <a:pPr algn="ctr"/>
+            <a:r>
+              <a:rPr lang="en-US" dirty="0"/>
+              <a:t>9</a:t>
             </a:r>
             <a:endParaRPr lang="nl-NL" dirty="0"/>
           </a:p>

</xml_diff>